<commit_message>
good first draft of program
</commit_message>
<xml_diff>
--- a/templates/test3.pptx
+++ b/templates/test3.pptx
@@ -5,9 +5,9 @@
     <p:sldMasterId id="2147483648" r:id="rId1"/>
   </p:sldMasterIdLst>
   <p:sldIdLst>
-    <p:sldId id="256" r:id="rId7"/>
+    <p:sldId id="256" r:id="rId2"/>
   </p:sldIdLst>
-  <p:sldSz cx="12198096" cy="6858000" type="screen4x3"/>
+  <p:sldSz cx="12198350" cy="6858000"/>
   <p:notesSz cx="6858000" cy="9144000"/>
   <p:defaultTextStyle>
     <a:defPPr>
@@ -104,6 +104,22 @@
       </a:defRPr>
     </a:lvl9pPr>
   </p:defaultTextStyle>
+  <p:extLst>
+    <p:ext uri="{EFAFB233-063F-42B5-8137-9DF3F51BA10A}">
+      <p15:sldGuideLst xmlns:p15="http://schemas.microsoft.com/office/powerpoint/2012/main">
+        <p15:guide id="1" orient="horz" pos="2160">
+          <p15:clr>
+            <a:srgbClr val="A4A3A4"/>
+          </p15:clr>
+        </p15:guide>
+        <p15:guide id="2" pos="2880">
+          <p15:clr>
+            <a:srgbClr val="A4A3A4"/>
+          </p15:clr>
+        </p15:guide>
+      </p15:sldGuideLst>
+    </p:ext>
+  </p:extLst>
 </p:presentation>
 </file>
 
@@ -145,10 +161,9 @@
           <a:lstStyle/>
           <a:p>
             <a:r>
-              <a:rPr lang="en-US" smtClean="0"/>
+              <a:rPr lang="en-US"/>
               <a:t>Click to edit Master title style</a:t>
             </a:r>
-            <a:endParaRPr lang="en-US"/>
           </a:p>
         </p:txBody>
       </p:sp>
@@ -264,10 +279,9 @@
           </a:lstStyle>
           <a:p>
             <a:r>
-              <a:rPr lang="en-US" smtClean="0"/>
+              <a:rPr lang="en-US"/>
               <a:t>Click to edit Master subtitle style</a:t>
             </a:r>
-            <a:endParaRPr lang="en-US"/>
           </a:p>
         </p:txBody>
       </p:sp>
@@ -288,7 +302,7 @@
           <a:p>
             <a:fld id="{5BCAD085-E8A6-8845-BD4E-CB4CCA059FC4}" type="datetimeFigureOut">
               <a:rPr lang="en-US" smtClean="0"/>
-              <a:t>1/27/13</a:t>
+              <a:t>9/17/2022</a:t>
             </a:fld>
             <a:endParaRPr lang="en-US"/>
           </a:p>
@@ -330,7 +344,7 @@
           <a:p>
             <a:fld id="{C1FF6DA9-008F-8B48-92A6-B652298478BF}" type="slidenum">
               <a:rPr lang="en-US" smtClean="0"/>
-              <a:t>‹#›</a:t>
+              <a:t>‹nº›</a:t>
             </a:fld>
             <a:endParaRPr lang="en-US"/>
           </a:p>
@@ -382,10 +396,9 @@
           <a:lstStyle/>
           <a:p>
             <a:r>
-              <a:rPr lang="en-US" smtClean="0"/>
+              <a:rPr lang="en-US"/>
               <a:t>Click to edit Master title style</a:t>
             </a:r>
-            <a:endParaRPr lang="en-US"/>
           </a:p>
         </p:txBody>
       </p:sp>
@@ -406,38 +419,37 @@
           <a:p>
             <a:pPr lvl="0"/>
             <a:r>
-              <a:rPr lang="en-US" smtClean="0"/>
+              <a:rPr lang="en-US"/>
               <a:t>Click to edit Master text styles</a:t>
             </a:r>
           </a:p>
           <a:p>
             <a:pPr lvl="1"/>
             <a:r>
-              <a:rPr lang="en-US" smtClean="0"/>
+              <a:rPr lang="en-US"/>
               <a:t>Second level</a:t>
             </a:r>
           </a:p>
           <a:p>
             <a:pPr lvl="2"/>
             <a:r>
-              <a:rPr lang="en-US" smtClean="0"/>
+              <a:rPr lang="en-US"/>
               <a:t>Third level</a:t>
             </a:r>
           </a:p>
           <a:p>
             <a:pPr lvl="3"/>
             <a:r>
-              <a:rPr lang="en-US" smtClean="0"/>
+              <a:rPr lang="en-US"/>
               <a:t>Fourth level</a:t>
             </a:r>
           </a:p>
           <a:p>
             <a:pPr lvl="4"/>
             <a:r>
-              <a:rPr lang="en-US" smtClean="0"/>
+              <a:rPr lang="en-US"/>
               <a:t>Fifth level</a:t>
             </a:r>
-            <a:endParaRPr lang="en-US"/>
           </a:p>
         </p:txBody>
       </p:sp>
@@ -458,7 +470,7 @@
           <a:p>
             <a:fld id="{5BCAD085-E8A6-8845-BD4E-CB4CCA059FC4}" type="datetimeFigureOut">
               <a:rPr lang="en-US" smtClean="0"/>
-              <a:t>1/27/13</a:t>
+              <a:t>9/17/2022</a:t>
             </a:fld>
             <a:endParaRPr lang="en-US"/>
           </a:p>
@@ -500,7 +512,7 @@
           <a:p>
             <a:fld id="{C1FF6DA9-008F-8B48-92A6-B652298478BF}" type="slidenum">
               <a:rPr lang="en-US" smtClean="0"/>
-              <a:t>‹#›</a:t>
+              <a:t>‹nº›</a:t>
             </a:fld>
             <a:endParaRPr lang="en-US"/>
           </a:p>
@@ -557,10 +569,9 @@
           <a:lstStyle/>
           <a:p>
             <a:r>
-              <a:rPr lang="en-US" smtClean="0"/>
+              <a:rPr lang="en-US"/>
               <a:t>Click to edit Master title style</a:t>
             </a:r>
-            <a:endParaRPr lang="en-US"/>
           </a:p>
         </p:txBody>
       </p:sp>
@@ -586,38 +597,37 @@
           <a:p>
             <a:pPr lvl="0"/>
             <a:r>
-              <a:rPr lang="en-US" smtClean="0"/>
+              <a:rPr lang="en-US"/>
               <a:t>Click to edit Master text styles</a:t>
             </a:r>
           </a:p>
           <a:p>
             <a:pPr lvl="1"/>
             <a:r>
-              <a:rPr lang="en-US" smtClean="0"/>
+              <a:rPr lang="en-US"/>
               <a:t>Second level</a:t>
             </a:r>
           </a:p>
           <a:p>
             <a:pPr lvl="2"/>
             <a:r>
-              <a:rPr lang="en-US" smtClean="0"/>
+              <a:rPr lang="en-US"/>
               <a:t>Third level</a:t>
             </a:r>
           </a:p>
           <a:p>
             <a:pPr lvl="3"/>
             <a:r>
-              <a:rPr lang="en-US" smtClean="0"/>
+              <a:rPr lang="en-US"/>
               <a:t>Fourth level</a:t>
             </a:r>
           </a:p>
           <a:p>
             <a:pPr lvl="4"/>
             <a:r>
-              <a:rPr lang="en-US" smtClean="0"/>
+              <a:rPr lang="en-US"/>
               <a:t>Fifth level</a:t>
             </a:r>
-            <a:endParaRPr lang="en-US"/>
           </a:p>
         </p:txBody>
       </p:sp>
@@ -638,7 +648,7 @@
           <a:p>
             <a:fld id="{5BCAD085-E8A6-8845-BD4E-CB4CCA059FC4}" type="datetimeFigureOut">
               <a:rPr lang="en-US" smtClean="0"/>
-              <a:t>1/27/13</a:t>
+              <a:t>9/17/2022</a:t>
             </a:fld>
             <a:endParaRPr lang="en-US"/>
           </a:p>
@@ -680,7 +690,7 @@
           <a:p>
             <a:fld id="{C1FF6DA9-008F-8B48-92A6-B652298478BF}" type="slidenum">
               <a:rPr lang="en-US" smtClean="0"/>
-              <a:t>‹#›</a:t>
+              <a:t>‹nº›</a:t>
             </a:fld>
             <a:endParaRPr lang="en-US"/>
           </a:p>
@@ -732,10 +742,9 @@
           <a:lstStyle/>
           <a:p>
             <a:r>
-              <a:rPr lang="en-US" smtClean="0"/>
+              <a:rPr lang="en-US"/>
               <a:t>Click to edit Master title style</a:t>
             </a:r>
-            <a:endParaRPr lang="en-US"/>
           </a:p>
         </p:txBody>
       </p:sp>
@@ -756,38 +765,37 @@
           <a:p>
             <a:pPr lvl="0"/>
             <a:r>
-              <a:rPr lang="en-US" smtClean="0"/>
+              <a:rPr lang="en-US"/>
               <a:t>Click to edit Master text styles</a:t>
             </a:r>
           </a:p>
           <a:p>
             <a:pPr lvl="1"/>
             <a:r>
-              <a:rPr lang="en-US" smtClean="0"/>
+              <a:rPr lang="en-US"/>
               <a:t>Second level</a:t>
             </a:r>
           </a:p>
           <a:p>
             <a:pPr lvl="2"/>
             <a:r>
-              <a:rPr lang="en-US" smtClean="0"/>
+              <a:rPr lang="en-US"/>
               <a:t>Third level</a:t>
             </a:r>
           </a:p>
           <a:p>
             <a:pPr lvl="3"/>
             <a:r>
-              <a:rPr lang="en-US" smtClean="0"/>
+              <a:rPr lang="en-US"/>
               <a:t>Fourth level</a:t>
             </a:r>
           </a:p>
           <a:p>
             <a:pPr lvl="4"/>
             <a:r>
-              <a:rPr lang="en-US" smtClean="0"/>
+              <a:rPr lang="en-US"/>
               <a:t>Fifth level</a:t>
             </a:r>
-            <a:endParaRPr lang="en-US"/>
           </a:p>
         </p:txBody>
       </p:sp>
@@ -808,7 +816,7 @@
           <a:p>
             <a:fld id="{5BCAD085-E8A6-8845-BD4E-CB4CCA059FC4}" type="datetimeFigureOut">
               <a:rPr lang="en-US" smtClean="0"/>
-              <a:t>1/27/13</a:t>
+              <a:t>9/17/2022</a:t>
             </a:fld>
             <a:endParaRPr lang="en-US"/>
           </a:p>
@@ -850,7 +858,7 @@
           <a:p>
             <a:fld id="{C1FF6DA9-008F-8B48-92A6-B652298478BF}" type="slidenum">
               <a:rPr lang="en-US" smtClean="0"/>
-              <a:t>‹#›</a:t>
+              <a:t>‹nº›</a:t>
             </a:fld>
             <a:endParaRPr lang="en-US"/>
           </a:p>
@@ -911,10 +919,9 @@
           </a:lstStyle>
           <a:p>
             <a:r>
-              <a:rPr lang="en-US" smtClean="0"/>
+              <a:rPr lang="en-US"/>
               <a:t>Click to edit Master title style</a:t>
             </a:r>
-            <a:endParaRPr lang="en-US"/>
           </a:p>
         </p:txBody>
       </p:sp>
@@ -1031,7 +1038,7 @@
           <a:p>
             <a:pPr lvl="0"/>
             <a:r>
-              <a:rPr lang="en-US" smtClean="0"/>
+              <a:rPr lang="en-US"/>
               <a:t>Click to edit Master text styles</a:t>
             </a:r>
           </a:p>
@@ -1054,7 +1061,7 @@
           <a:p>
             <a:fld id="{5BCAD085-E8A6-8845-BD4E-CB4CCA059FC4}" type="datetimeFigureOut">
               <a:rPr lang="en-US" smtClean="0"/>
-              <a:t>1/27/13</a:t>
+              <a:t>9/17/2022</a:t>
             </a:fld>
             <a:endParaRPr lang="en-US"/>
           </a:p>
@@ -1096,7 +1103,7 @@
           <a:p>
             <a:fld id="{C1FF6DA9-008F-8B48-92A6-B652298478BF}" type="slidenum">
               <a:rPr lang="en-US" smtClean="0"/>
-              <a:t>‹#›</a:t>
+              <a:t>‹nº›</a:t>
             </a:fld>
             <a:endParaRPr lang="en-US"/>
           </a:p>
@@ -1148,10 +1155,9 @@
           <a:lstStyle/>
           <a:p>
             <a:r>
-              <a:rPr lang="en-US" smtClean="0"/>
+              <a:rPr lang="en-US"/>
               <a:t>Click to edit Master title style</a:t>
             </a:r>
-            <a:endParaRPr lang="en-US"/>
           </a:p>
         </p:txBody>
       </p:sp>
@@ -1205,38 +1211,37 @@
           <a:p>
             <a:pPr lvl="0"/>
             <a:r>
-              <a:rPr lang="en-US" smtClean="0"/>
+              <a:rPr lang="en-US"/>
               <a:t>Click to edit Master text styles</a:t>
             </a:r>
           </a:p>
           <a:p>
             <a:pPr lvl="1"/>
             <a:r>
-              <a:rPr lang="en-US" smtClean="0"/>
+              <a:rPr lang="en-US"/>
               <a:t>Second level</a:t>
             </a:r>
           </a:p>
           <a:p>
             <a:pPr lvl="2"/>
             <a:r>
-              <a:rPr lang="en-US" smtClean="0"/>
+              <a:rPr lang="en-US"/>
               <a:t>Third level</a:t>
             </a:r>
           </a:p>
           <a:p>
             <a:pPr lvl="3"/>
             <a:r>
-              <a:rPr lang="en-US" smtClean="0"/>
+              <a:rPr lang="en-US"/>
               <a:t>Fourth level</a:t>
             </a:r>
           </a:p>
           <a:p>
             <a:pPr lvl="4"/>
             <a:r>
-              <a:rPr lang="en-US" smtClean="0"/>
+              <a:rPr lang="en-US"/>
               <a:t>Fifth level</a:t>
             </a:r>
-            <a:endParaRPr lang="en-US"/>
           </a:p>
         </p:txBody>
       </p:sp>
@@ -1290,38 +1295,37 @@
           <a:p>
             <a:pPr lvl="0"/>
             <a:r>
-              <a:rPr lang="en-US" smtClean="0"/>
+              <a:rPr lang="en-US"/>
               <a:t>Click to edit Master text styles</a:t>
             </a:r>
           </a:p>
           <a:p>
             <a:pPr lvl="1"/>
             <a:r>
-              <a:rPr lang="en-US" smtClean="0"/>
+              <a:rPr lang="en-US"/>
               <a:t>Second level</a:t>
             </a:r>
           </a:p>
           <a:p>
             <a:pPr lvl="2"/>
             <a:r>
-              <a:rPr lang="en-US" smtClean="0"/>
+              <a:rPr lang="en-US"/>
               <a:t>Third level</a:t>
             </a:r>
           </a:p>
           <a:p>
             <a:pPr lvl="3"/>
             <a:r>
-              <a:rPr lang="en-US" smtClean="0"/>
+              <a:rPr lang="en-US"/>
               <a:t>Fourth level</a:t>
             </a:r>
           </a:p>
           <a:p>
             <a:pPr lvl="4"/>
             <a:r>
-              <a:rPr lang="en-US" smtClean="0"/>
+              <a:rPr lang="en-US"/>
               <a:t>Fifth level</a:t>
             </a:r>
-            <a:endParaRPr lang="en-US"/>
           </a:p>
         </p:txBody>
       </p:sp>
@@ -1342,7 +1346,7 @@
           <a:p>
             <a:fld id="{5BCAD085-E8A6-8845-BD4E-CB4CCA059FC4}" type="datetimeFigureOut">
               <a:rPr lang="en-US" smtClean="0"/>
-              <a:t>1/27/13</a:t>
+              <a:t>9/17/2022</a:t>
             </a:fld>
             <a:endParaRPr lang="en-US"/>
           </a:p>
@@ -1384,7 +1388,7 @@
           <a:p>
             <a:fld id="{C1FF6DA9-008F-8B48-92A6-B652298478BF}" type="slidenum">
               <a:rPr lang="en-US" smtClean="0"/>
-              <a:t>‹#›</a:t>
+              <a:t>‹nº›</a:t>
             </a:fld>
             <a:endParaRPr lang="en-US"/>
           </a:p>
@@ -1440,10 +1444,9 @@
           </a:lstStyle>
           <a:p>
             <a:r>
-              <a:rPr lang="en-US" smtClean="0"/>
+              <a:rPr lang="en-US"/>
               <a:t>Click to edit Master title style</a:t>
             </a:r>
-            <a:endParaRPr lang="en-US"/>
           </a:p>
         </p:txBody>
       </p:sp>
@@ -1506,7 +1509,7 @@
           <a:p>
             <a:pPr lvl="0"/>
             <a:r>
-              <a:rPr lang="en-US" smtClean="0"/>
+              <a:rPr lang="en-US"/>
               <a:t>Click to edit Master text styles</a:t>
             </a:r>
           </a:p>
@@ -1562,38 +1565,37 @@
           <a:p>
             <a:pPr lvl="0"/>
             <a:r>
-              <a:rPr lang="en-US" smtClean="0"/>
+              <a:rPr lang="en-US"/>
               <a:t>Click to edit Master text styles</a:t>
             </a:r>
           </a:p>
           <a:p>
             <a:pPr lvl="1"/>
             <a:r>
-              <a:rPr lang="en-US" smtClean="0"/>
+              <a:rPr lang="en-US"/>
               <a:t>Second level</a:t>
             </a:r>
           </a:p>
           <a:p>
             <a:pPr lvl="2"/>
             <a:r>
-              <a:rPr lang="en-US" smtClean="0"/>
+              <a:rPr lang="en-US"/>
               <a:t>Third level</a:t>
             </a:r>
           </a:p>
           <a:p>
             <a:pPr lvl="3"/>
             <a:r>
-              <a:rPr lang="en-US" smtClean="0"/>
+              <a:rPr lang="en-US"/>
               <a:t>Fourth level</a:t>
             </a:r>
           </a:p>
           <a:p>
             <a:pPr lvl="4"/>
             <a:r>
-              <a:rPr lang="en-US" smtClean="0"/>
+              <a:rPr lang="en-US"/>
               <a:t>Fifth level</a:t>
             </a:r>
-            <a:endParaRPr lang="en-US"/>
           </a:p>
         </p:txBody>
       </p:sp>
@@ -1656,7 +1658,7 @@
           <a:p>
             <a:pPr lvl="0"/>
             <a:r>
-              <a:rPr lang="en-US" smtClean="0"/>
+              <a:rPr lang="en-US"/>
               <a:t>Click to edit Master text styles</a:t>
             </a:r>
           </a:p>
@@ -1712,38 +1714,37 @@
           <a:p>
             <a:pPr lvl="0"/>
             <a:r>
-              <a:rPr lang="en-US" smtClean="0"/>
+              <a:rPr lang="en-US"/>
               <a:t>Click to edit Master text styles</a:t>
             </a:r>
           </a:p>
           <a:p>
             <a:pPr lvl="1"/>
             <a:r>
-              <a:rPr lang="en-US" smtClean="0"/>
+              <a:rPr lang="en-US"/>
               <a:t>Second level</a:t>
             </a:r>
           </a:p>
           <a:p>
             <a:pPr lvl="2"/>
             <a:r>
-              <a:rPr lang="en-US" smtClean="0"/>
+              <a:rPr lang="en-US"/>
               <a:t>Third level</a:t>
             </a:r>
           </a:p>
           <a:p>
             <a:pPr lvl="3"/>
             <a:r>
-              <a:rPr lang="en-US" smtClean="0"/>
+              <a:rPr lang="en-US"/>
               <a:t>Fourth level</a:t>
             </a:r>
           </a:p>
           <a:p>
             <a:pPr lvl="4"/>
             <a:r>
-              <a:rPr lang="en-US" smtClean="0"/>
+              <a:rPr lang="en-US"/>
               <a:t>Fifth level</a:t>
             </a:r>
-            <a:endParaRPr lang="en-US"/>
           </a:p>
         </p:txBody>
       </p:sp>
@@ -1764,7 +1765,7 @@
           <a:p>
             <a:fld id="{5BCAD085-E8A6-8845-BD4E-CB4CCA059FC4}" type="datetimeFigureOut">
               <a:rPr lang="en-US" smtClean="0"/>
-              <a:t>1/27/13</a:t>
+              <a:t>9/17/2022</a:t>
             </a:fld>
             <a:endParaRPr lang="en-US"/>
           </a:p>
@@ -1806,7 +1807,7 @@
           <a:p>
             <a:fld id="{C1FF6DA9-008F-8B48-92A6-B652298478BF}" type="slidenum">
               <a:rPr lang="en-US" smtClean="0"/>
-              <a:t>‹#›</a:t>
+              <a:t>‹nº›</a:t>
             </a:fld>
             <a:endParaRPr lang="en-US"/>
           </a:p>
@@ -1858,10 +1859,9 @@
           <a:lstStyle/>
           <a:p>
             <a:r>
-              <a:rPr lang="en-US" smtClean="0"/>
+              <a:rPr lang="en-US"/>
               <a:t>Click to edit Master title style</a:t>
             </a:r>
-            <a:endParaRPr lang="en-US"/>
           </a:p>
         </p:txBody>
       </p:sp>
@@ -1882,7 +1882,7 @@
           <a:p>
             <a:fld id="{5BCAD085-E8A6-8845-BD4E-CB4CCA059FC4}" type="datetimeFigureOut">
               <a:rPr lang="en-US" smtClean="0"/>
-              <a:t>1/27/13</a:t>
+              <a:t>9/17/2022</a:t>
             </a:fld>
             <a:endParaRPr lang="en-US"/>
           </a:p>
@@ -1924,7 +1924,7 @@
           <a:p>
             <a:fld id="{C1FF6DA9-008F-8B48-92A6-B652298478BF}" type="slidenum">
               <a:rPr lang="en-US" smtClean="0"/>
-              <a:t>‹#›</a:t>
+              <a:t>‹nº›</a:t>
             </a:fld>
             <a:endParaRPr lang="en-US"/>
           </a:p>
@@ -1977,7 +1977,7 @@
           <a:p>
             <a:fld id="{5BCAD085-E8A6-8845-BD4E-CB4CCA059FC4}" type="datetimeFigureOut">
               <a:rPr lang="en-US" smtClean="0"/>
-              <a:t>1/27/13</a:t>
+              <a:t>9/17/2022</a:t>
             </a:fld>
             <a:endParaRPr lang="en-US"/>
           </a:p>
@@ -2019,7 +2019,7 @@
           <a:p>
             <a:fld id="{C1FF6DA9-008F-8B48-92A6-B652298478BF}" type="slidenum">
               <a:rPr lang="en-US" smtClean="0"/>
-              <a:t>‹#›</a:t>
+              <a:t>‹nº›</a:t>
             </a:fld>
             <a:endParaRPr lang="en-US"/>
           </a:p>
@@ -2080,10 +2080,9 @@
           </a:lstStyle>
           <a:p>
             <a:r>
-              <a:rPr lang="en-US" smtClean="0"/>
+              <a:rPr lang="en-US"/>
               <a:t>Click to edit Master title style</a:t>
             </a:r>
-            <a:endParaRPr lang="en-US"/>
           </a:p>
         </p:txBody>
       </p:sp>
@@ -2137,38 +2136,37 @@
           <a:p>
             <a:pPr lvl="0"/>
             <a:r>
-              <a:rPr lang="en-US" smtClean="0"/>
+              <a:rPr lang="en-US"/>
               <a:t>Click to edit Master text styles</a:t>
             </a:r>
           </a:p>
           <a:p>
             <a:pPr lvl="1"/>
             <a:r>
-              <a:rPr lang="en-US" smtClean="0"/>
+              <a:rPr lang="en-US"/>
               <a:t>Second level</a:t>
             </a:r>
           </a:p>
           <a:p>
             <a:pPr lvl="2"/>
             <a:r>
-              <a:rPr lang="en-US" smtClean="0"/>
+              <a:rPr lang="en-US"/>
               <a:t>Third level</a:t>
             </a:r>
           </a:p>
           <a:p>
             <a:pPr lvl="3"/>
             <a:r>
-              <a:rPr lang="en-US" smtClean="0"/>
+              <a:rPr lang="en-US"/>
               <a:t>Fourth level</a:t>
             </a:r>
           </a:p>
           <a:p>
             <a:pPr lvl="4"/>
             <a:r>
-              <a:rPr lang="en-US" smtClean="0"/>
+              <a:rPr lang="en-US"/>
               <a:t>Fifth level</a:t>
             </a:r>
-            <a:endParaRPr lang="en-US"/>
           </a:p>
         </p:txBody>
       </p:sp>
@@ -2231,7 +2229,7 @@
           <a:p>
             <a:pPr lvl="0"/>
             <a:r>
-              <a:rPr lang="en-US" smtClean="0"/>
+              <a:rPr lang="en-US"/>
               <a:t>Click to edit Master text styles</a:t>
             </a:r>
           </a:p>
@@ -2254,7 +2252,7 @@
           <a:p>
             <a:fld id="{5BCAD085-E8A6-8845-BD4E-CB4CCA059FC4}" type="datetimeFigureOut">
               <a:rPr lang="en-US" smtClean="0"/>
-              <a:t>1/27/13</a:t>
+              <a:t>9/17/2022</a:t>
             </a:fld>
             <a:endParaRPr lang="en-US"/>
           </a:p>
@@ -2296,7 +2294,7 @@
           <a:p>
             <a:fld id="{C1FF6DA9-008F-8B48-92A6-B652298478BF}" type="slidenum">
               <a:rPr lang="en-US" smtClean="0"/>
-              <a:t>‹#›</a:t>
+              <a:t>‹nº›</a:t>
             </a:fld>
             <a:endParaRPr lang="en-US"/>
           </a:p>
@@ -2357,10 +2355,9 @@
           </a:lstStyle>
           <a:p>
             <a:r>
-              <a:rPr lang="en-US" smtClean="0"/>
+              <a:rPr lang="en-US"/>
               <a:t>Click to edit Master title style</a:t>
             </a:r>
-            <a:endParaRPr lang="en-US"/>
           </a:p>
         </p:txBody>
       </p:sp>
@@ -2484,7 +2481,7 @@
           <a:p>
             <a:pPr lvl="0"/>
             <a:r>
-              <a:rPr lang="en-US" smtClean="0"/>
+              <a:rPr lang="en-US"/>
               <a:t>Click to edit Master text styles</a:t>
             </a:r>
           </a:p>
@@ -2507,7 +2504,7 @@
           <a:p>
             <a:fld id="{5BCAD085-E8A6-8845-BD4E-CB4CCA059FC4}" type="datetimeFigureOut">
               <a:rPr lang="en-US" smtClean="0"/>
-              <a:t>1/27/13</a:t>
+              <a:t>9/17/2022</a:t>
             </a:fld>
             <a:endParaRPr lang="en-US"/>
           </a:p>
@@ -2549,7 +2546,7 @@
           <a:p>
             <a:fld id="{C1FF6DA9-008F-8B48-92A6-B652298478BF}" type="slidenum">
               <a:rPr lang="en-US" smtClean="0"/>
-              <a:t>‹#›</a:t>
+              <a:t>‹nº›</a:t>
             </a:fld>
             <a:endParaRPr lang="en-US"/>
           </a:p>
@@ -2616,10 +2613,9 @@
           <a:lstStyle/>
           <a:p>
             <a:r>
-              <a:rPr lang="en-US" smtClean="0"/>
+              <a:rPr lang="en-US"/>
               <a:t>Click to edit Master title style</a:t>
             </a:r>
-            <a:endParaRPr lang="en-US"/>
           </a:p>
         </p:txBody>
       </p:sp>
@@ -2650,38 +2646,37 @@
           <a:p>
             <a:pPr lvl="0"/>
             <a:r>
-              <a:rPr lang="en-US" smtClean="0"/>
+              <a:rPr lang="en-US"/>
               <a:t>Click to edit Master text styles</a:t>
             </a:r>
           </a:p>
           <a:p>
             <a:pPr lvl="1"/>
             <a:r>
-              <a:rPr lang="en-US" smtClean="0"/>
+              <a:rPr lang="en-US"/>
               <a:t>Second level</a:t>
             </a:r>
           </a:p>
           <a:p>
             <a:pPr lvl="2"/>
             <a:r>
-              <a:rPr lang="en-US" smtClean="0"/>
+              <a:rPr lang="en-US"/>
               <a:t>Third level</a:t>
             </a:r>
           </a:p>
           <a:p>
             <a:pPr lvl="3"/>
             <a:r>
-              <a:rPr lang="en-US" smtClean="0"/>
+              <a:rPr lang="en-US"/>
               <a:t>Fourth level</a:t>
             </a:r>
           </a:p>
           <a:p>
             <a:pPr lvl="4"/>
             <a:r>
-              <a:rPr lang="en-US" smtClean="0"/>
+              <a:rPr lang="en-US"/>
               <a:t>Fifth level</a:t>
             </a:r>
-            <a:endParaRPr lang="en-US"/>
           </a:p>
         </p:txBody>
       </p:sp>
@@ -2720,7 +2715,7 @@
           <a:p>
             <a:fld id="{5BCAD085-E8A6-8845-BD4E-CB4CCA059FC4}" type="datetimeFigureOut">
               <a:rPr lang="en-US" smtClean="0"/>
-              <a:t>1/27/13</a:t>
+              <a:t>9/17/2022</a:t>
             </a:fld>
             <a:endParaRPr lang="en-US"/>
           </a:p>
@@ -2798,7 +2793,7 @@
           <a:p>
             <a:fld id="{C1FF6DA9-008F-8B48-92A6-B652298478BF}" type="slidenum">
               <a:rPr lang="en-US" smtClean="0"/>
-              <a:t>‹#›</a:t>
+              <a:t>‹nº›</a:t>
             </a:fld>
             <a:endParaRPr lang="en-US"/>
           </a:p>
@@ -3079,7 +3074,7 @@
 </file>
 
 <file path=ppt/slides/slide1.xml><?xml version="1.0" encoding="utf-8"?>
-<p:sld xmlns:a="http://schemas.openxmlformats.org/drawingml/2006/main" xmlns:p="http://schemas.openxmlformats.org/presentationml/2006/main" xmlns:r="http://schemas.openxmlformats.org/officeDocument/2006/relationships">
+<p:sld xmlns:a="http://schemas.openxmlformats.org/drawingml/2006/main" xmlns:r="http://schemas.openxmlformats.org/officeDocument/2006/relationships" xmlns:p="http://schemas.openxmlformats.org/presentationml/2006/main">
   <p:cSld>
     <p:spTree>
       <p:nvGrpSpPr>
@@ -3087,7 +3082,14 @@
         <p:cNvGrpSpPr/>
         <p:nvPr/>
       </p:nvGrpSpPr>
-      <p:grpSpPr/>
+      <p:grpSpPr>
+        <a:xfrm>
+          <a:off x="0" y="0"/>
+          <a:ext cx="0" cy="0"/>
+          <a:chOff x="0" y="0"/>
+          <a:chExt cx="0" cy="0"/>
+        </a:xfrm>
+      </p:grpSpPr>
       <p:sp>
         <p:nvSpPr>
           <p:cNvPr id="2" name="TextBox 1"/>
@@ -3096,7 +3098,7 @@
         </p:nvSpPr>
         <p:spPr>
           <a:xfrm>
-            <a:off x="4279765" y="5806914"/>
+            <a:off x="1461151" y="5806914"/>
             <a:ext cx="3827287" cy="646331"/>
           </a:xfrm>
           <a:prstGeom prst="rect">
@@ -3111,11 +3113,13 @@
           <a:lstStyle/>
           <a:p>
             <a:r>
+              <a:rPr dirty="0"/>
               <a:t>Hello WORLD</a:t>
             </a:r>
           </a:p>
           <a:p>
             <a:r>
+              <a:rPr dirty="0"/>
               <a:t>QUE MANEIRO</a:t>
             </a:r>
           </a:p>
@@ -3193,6 +3197,48 @@
           </a:prstGeom>
         </p:spPr>
       </p:pic>
+      <p:sp>
+        <p:nvSpPr>
+          <p:cNvPr id="6" name="TextBox 1">
+            <a:extLst>
+              <a:ext uri="{FF2B5EF4-FFF2-40B4-BE49-F238E27FC236}">
+                <a16:creationId xmlns:a16="http://schemas.microsoft.com/office/drawing/2014/main" id="{288D40BD-4645-EA8C-6C92-D2562A9D3890}"/>
+              </a:ext>
+            </a:extLst>
+          </p:cNvPr>
+          <p:cNvSpPr txBox="1"/>
+          <p:nvPr/>
+        </p:nvSpPr>
+        <p:spPr>
+          <a:xfrm>
+            <a:off x="7476350" y="5806914"/>
+            <a:ext cx="2953461" cy="646331"/>
+          </a:xfrm>
+          <a:prstGeom prst="rect">
+            <a:avLst/>
+          </a:prstGeom>
+          <a:noFill/>
+        </p:spPr>
+        <p:txBody>
+          <a:bodyPr wrap="square">
+            <a:spAutoFit/>
+          </a:bodyPr>
+          <a:lstStyle/>
+          <a:p>
+            <a:r>
+              <a:rPr lang="pt-BR" u="sng" dirty="0"/>
+              <a:t>Teste</a:t>
+            </a:r>
+          </a:p>
+          <a:p>
+            <a:r>
+              <a:rPr lang="pt-BR" u="sng" dirty="0"/>
+              <a:t>TESTE</a:t>
+            </a:r>
+            <a:endParaRPr u="sng" dirty="0"/>
+          </a:p>
+        </p:txBody>
+      </p:sp>
     </p:spTree>
   </p:cSld>
   <p:clrMapOvr>

</xml_diff>